<commit_message>
Create & Update some files
</commit_message>
<xml_diff>
--- a/UML/NIR-File/Презентация.pptx
+++ b/UML/NIR-File/Презентация.pptx
@@ -5,13 +5,17 @@
     <p:sldMasterId id="2147483648" r:id="rId1"/>
   </p:sldMasterIdLst>
   <p:notesMasterIdLst>
-    <p:notesMasterId r:id="rId6"/>
+    <p:notesMasterId r:id="rId10"/>
   </p:notesMasterIdLst>
   <p:sldIdLst>
     <p:sldId id="271" r:id="rId2"/>
     <p:sldId id="272" r:id="rId3"/>
     <p:sldId id="257" r:id="rId4"/>
     <p:sldId id="259" r:id="rId5"/>
+    <p:sldId id="273" r:id="rId6"/>
+    <p:sldId id="274" r:id="rId7"/>
+    <p:sldId id="275" r:id="rId8"/>
+    <p:sldId id="276" r:id="rId9"/>
   </p:sldIdLst>
   <p:sldSz cx="12192000" cy="6858000"/>
   <p:notesSz cx="6858000" cy="9144000"/>
@@ -110,6 +114,11 @@
       </a:defRPr>
     </a:lvl9pPr>
   </p:defaultTextStyle>
+  <p:extLst>
+    <p:ext uri="{EFAFB233-063F-42B5-8137-9DF3F51BA10A}">
+      <p15:sldGuideLst xmlns:p15="http://schemas.microsoft.com/office/powerpoint/2012/main"/>
+    </p:ext>
+  </p:extLst>
 </p:presentation>
 </file>
 
@@ -195,7 +204,7 @@
           <a:p>
             <a:fld id="{FAEA55AF-6180-4766-B926-7620385C9E85}" type="datetimeFigureOut">
               <a:rPr lang="ru-RU" smtClean="0"/>
-              <a:t>18.05.2022</a:t>
+              <a:t>19.05.2022</a:t>
             </a:fld>
             <a:endParaRPr lang="ru-RU"/>
           </a:p>
@@ -1064,7 +1073,7 @@
           <a:p>
             <a:fld id="{53B99E81-CFD6-49F6-89DD-621C6E69F710}" type="datetimeFigureOut">
               <a:rPr lang="ru-RU" smtClean="0"/>
-              <a:t>18.05.2022</a:t>
+              <a:t>19.05.2022</a:t>
             </a:fld>
             <a:endParaRPr lang="ru-RU"/>
           </a:p>
@@ -1262,7 +1271,7 @@
           <a:p>
             <a:fld id="{53B99E81-CFD6-49F6-89DD-621C6E69F710}" type="datetimeFigureOut">
               <a:rPr lang="ru-RU" smtClean="0"/>
-              <a:t>18.05.2022</a:t>
+              <a:t>19.05.2022</a:t>
             </a:fld>
             <a:endParaRPr lang="ru-RU"/>
           </a:p>
@@ -1470,7 +1479,7 @@
           <a:p>
             <a:fld id="{53B99E81-CFD6-49F6-89DD-621C6E69F710}" type="datetimeFigureOut">
               <a:rPr lang="ru-RU" smtClean="0"/>
-              <a:t>18.05.2022</a:t>
+              <a:t>19.05.2022</a:t>
             </a:fld>
             <a:endParaRPr lang="ru-RU"/>
           </a:p>
@@ -1668,7 +1677,7 @@
           <a:p>
             <a:fld id="{53B99E81-CFD6-49F6-89DD-621C6E69F710}" type="datetimeFigureOut">
               <a:rPr lang="ru-RU" smtClean="0"/>
-              <a:t>18.05.2022</a:t>
+              <a:t>19.05.2022</a:t>
             </a:fld>
             <a:endParaRPr lang="ru-RU"/>
           </a:p>
@@ -1943,7 +1952,7 @@
           <a:p>
             <a:fld id="{53B99E81-CFD6-49F6-89DD-621C6E69F710}" type="datetimeFigureOut">
               <a:rPr lang="ru-RU" smtClean="0"/>
-              <a:t>18.05.2022</a:t>
+              <a:t>19.05.2022</a:t>
             </a:fld>
             <a:endParaRPr lang="ru-RU"/>
           </a:p>
@@ -2208,7 +2217,7 @@
           <a:p>
             <a:fld id="{53B99E81-CFD6-49F6-89DD-621C6E69F710}" type="datetimeFigureOut">
               <a:rPr lang="ru-RU" smtClean="0"/>
-              <a:t>18.05.2022</a:t>
+              <a:t>19.05.2022</a:t>
             </a:fld>
             <a:endParaRPr lang="ru-RU"/>
           </a:p>
@@ -2620,7 +2629,7 @@
           <a:p>
             <a:fld id="{53B99E81-CFD6-49F6-89DD-621C6E69F710}" type="datetimeFigureOut">
               <a:rPr lang="ru-RU" smtClean="0"/>
-              <a:t>18.05.2022</a:t>
+              <a:t>19.05.2022</a:t>
             </a:fld>
             <a:endParaRPr lang="ru-RU"/>
           </a:p>
@@ -2761,7 +2770,7 @@
           <a:p>
             <a:fld id="{53B99E81-CFD6-49F6-89DD-621C6E69F710}" type="datetimeFigureOut">
               <a:rPr lang="ru-RU" smtClean="0"/>
-              <a:t>18.05.2022</a:t>
+              <a:t>19.05.2022</a:t>
             </a:fld>
             <a:endParaRPr lang="ru-RU"/>
           </a:p>
@@ -2874,7 +2883,7 @@
           <a:p>
             <a:fld id="{53B99E81-CFD6-49F6-89DD-621C6E69F710}" type="datetimeFigureOut">
               <a:rPr lang="ru-RU" smtClean="0"/>
-              <a:t>18.05.2022</a:t>
+              <a:t>19.05.2022</a:t>
             </a:fld>
             <a:endParaRPr lang="ru-RU"/>
           </a:p>
@@ -3185,7 +3194,7 @@
           <a:p>
             <a:fld id="{53B99E81-CFD6-49F6-89DD-621C6E69F710}" type="datetimeFigureOut">
               <a:rPr lang="ru-RU" smtClean="0"/>
-              <a:t>18.05.2022</a:t>
+              <a:t>19.05.2022</a:t>
             </a:fld>
             <a:endParaRPr lang="ru-RU"/>
           </a:p>
@@ -3473,7 +3482,7 @@
           <a:p>
             <a:fld id="{53B99E81-CFD6-49F6-89DD-621C6E69F710}" type="datetimeFigureOut">
               <a:rPr lang="ru-RU" smtClean="0"/>
-              <a:t>18.05.2022</a:t>
+              <a:t>19.05.2022</a:t>
             </a:fld>
             <a:endParaRPr lang="ru-RU"/>
           </a:p>
@@ -3714,7 +3723,7 @@
           <a:p>
             <a:fld id="{53B99E81-CFD6-49F6-89DD-621C6E69F710}" type="datetimeFigureOut">
               <a:rPr lang="ru-RU" smtClean="0"/>
-              <a:t>18.05.2022</a:t>
+              <a:t>19.05.2022</a:t>
             </a:fld>
             <a:endParaRPr lang="ru-RU"/>
           </a:p>
@@ -5563,7 +5572,1412 @@
           </a:p>
         </p:txBody>
       </p:sp>
+      <p:pic>
+        <p:nvPicPr>
+          <p:cNvPr id="3" name="Рисунок 2" descr="Изображение выглядит как текст&#10;&#10;Автоматически созданное описание"/>
+          <p:cNvPicPr/>
+          <p:nvPr/>
+        </p:nvPicPr>
+        <p:blipFill>
+          <a:blip r:embed="rId3">
+            <a:extLst>
+              <a:ext uri="{28A0092B-C50C-407E-A947-70E740481C1C}">
+                <a14:useLocalDpi xmlns:a14="http://schemas.microsoft.com/office/drawing/2010/main" val="0"/>
+              </a:ext>
+            </a:extLst>
+          </a:blip>
+          <a:srcRect/>
+          <a:stretch>
+            <a:fillRect/>
+          </a:stretch>
+        </p:blipFill>
+        <p:spPr bwMode="auto">
+          <a:xfrm>
+            <a:off x="874956" y="1488603"/>
+            <a:ext cx="5940425" cy="3775483"/>
+          </a:xfrm>
+          <a:prstGeom prst="rect">
+            <a:avLst/>
+          </a:prstGeom>
+          <a:noFill/>
+          <a:ln>
+            <a:noFill/>
+          </a:ln>
+        </p:spPr>
+      </p:pic>
+      <p:pic>
+        <p:nvPicPr>
+          <p:cNvPr id="6" name="Объект 3"/>
+          <p:cNvPicPr>
+            <a:picLocks noGrp="1"/>
+          </p:cNvPicPr>
+          <p:nvPr>
+            <p:ph idx="1"/>
+          </p:nvPr>
+        </p:nvPicPr>
+        <p:blipFill>
+          <a:blip r:embed="rId4">
+            <a:extLst>
+              <a:ext uri="{28A0092B-C50C-407E-A947-70E740481C1C}">
+                <a14:useLocalDpi xmlns:a14="http://schemas.microsoft.com/office/drawing/2010/main" val="0"/>
+              </a:ext>
+            </a:extLst>
+          </a:blip>
+          <a:srcRect/>
+          <a:stretch>
+            <a:fillRect/>
+          </a:stretch>
+        </p:blipFill>
+        <p:spPr bwMode="auto">
+          <a:xfrm>
+            <a:off x="6954715" y="2611771"/>
+            <a:ext cx="4818185" cy="1388729"/>
+          </a:xfrm>
+          <a:prstGeom prst="rect">
+            <a:avLst/>
+          </a:prstGeom>
+          <a:noFill/>
+          <a:ln>
+            <a:noFill/>
+          </a:ln>
+        </p:spPr>
+      </p:pic>
     </p:spTree>
+  </p:cSld>
+  <p:clrMapOvr>
+    <a:masterClrMapping/>
+  </p:clrMapOvr>
+</p:sld>
+</file>
+
+<file path=ppt/slides/slide5.xml><?xml version="1.0" encoding="utf-8"?>
+<p:sld xmlns:a="http://schemas.openxmlformats.org/drawingml/2006/main" xmlns:r="http://schemas.openxmlformats.org/officeDocument/2006/relationships" xmlns:p="http://schemas.openxmlformats.org/presentationml/2006/main">
+  <p:cSld>
+    <p:spTree>
+      <p:nvGrpSpPr>
+        <p:cNvPr id="1" name=""/>
+        <p:cNvGrpSpPr/>
+        <p:nvPr/>
+      </p:nvGrpSpPr>
+      <p:grpSpPr>
+        <a:xfrm>
+          <a:off x="0" y="0"/>
+          <a:ext cx="0" cy="0"/>
+          <a:chOff x="0" y="0"/>
+          <a:chExt cx="0" cy="0"/>
+        </a:xfrm>
+      </p:grpSpPr>
+      <p:pic>
+        <p:nvPicPr>
+          <p:cNvPr id="4" name="Объект 3" descr="Изображение выглядит как текст&#10;&#10;Автоматически созданное описание"/>
+          <p:cNvPicPr>
+            <a:picLocks noGrp="1"/>
+          </p:cNvPicPr>
+          <p:nvPr>
+            <p:ph idx="1"/>
+          </p:nvPr>
+        </p:nvPicPr>
+        <p:blipFill>
+          <a:blip r:embed="rId2">
+            <a:extLst>
+              <a:ext uri="{28A0092B-C50C-407E-A947-70E740481C1C}">
+                <a14:useLocalDpi xmlns:a14="http://schemas.microsoft.com/office/drawing/2010/main" val="0"/>
+              </a:ext>
+            </a:extLst>
+          </a:blip>
+          <a:srcRect/>
+          <a:stretch>
+            <a:fillRect/>
+          </a:stretch>
+        </p:blipFill>
+        <p:spPr bwMode="auto">
+          <a:xfrm>
+            <a:off x="3217985" y="395654"/>
+            <a:ext cx="6658708" cy="5452941"/>
+          </a:xfrm>
+          <a:prstGeom prst="rect">
+            <a:avLst/>
+          </a:prstGeom>
+          <a:noFill/>
+          <a:ln>
+            <a:noFill/>
+          </a:ln>
+        </p:spPr>
+      </p:pic>
+    </p:spTree>
+    <p:extLst>
+      <p:ext uri="{BB962C8B-B14F-4D97-AF65-F5344CB8AC3E}">
+        <p14:creationId xmlns:p14="http://schemas.microsoft.com/office/powerpoint/2010/main" val="1482535726"/>
+      </p:ext>
+    </p:extLst>
+  </p:cSld>
+  <p:clrMapOvr>
+    <a:masterClrMapping/>
+  </p:clrMapOvr>
+</p:sld>
+</file>
+
+<file path=ppt/slides/slide6.xml><?xml version="1.0" encoding="utf-8"?>
+<p:sld xmlns:a="http://schemas.openxmlformats.org/drawingml/2006/main" xmlns:r="http://schemas.openxmlformats.org/officeDocument/2006/relationships" xmlns:p="http://schemas.openxmlformats.org/presentationml/2006/main">
+  <p:cSld>
+    <p:spTree>
+      <p:nvGrpSpPr>
+        <p:cNvPr id="1" name=""/>
+        <p:cNvGrpSpPr/>
+        <p:nvPr/>
+      </p:nvGrpSpPr>
+      <p:grpSpPr>
+        <a:xfrm>
+          <a:off x="0" y="0"/>
+          <a:ext cx="0" cy="0"/>
+          <a:chOff x="0" y="0"/>
+          <a:chExt cx="0" cy="0"/>
+        </a:xfrm>
+      </p:grpSpPr>
+      <p:sp>
+        <p:nvSpPr>
+          <p:cNvPr id="2" name="Заголовок 1"/>
+          <p:cNvSpPr>
+            <a:spLocks noGrp="1"/>
+          </p:cNvSpPr>
+          <p:nvPr>
+            <p:ph type="title"/>
+          </p:nvPr>
+        </p:nvSpPr>
+        <p:spPr/>
+        <p:txBody>
+          <a:bodyPr>
+            <a:normAutofit/>
+          </a:bodyPr>
+          <a:lstStyle/>
+          <a:p>
+            <a:pPr algn="ctr"/>
+            <a:r>
+              <a:rPr lang="ru-RU" dirty="0">
+                <a:latin typeface="Arial"/>
+                <a:ea typeface="Arial"/>
+                <a:cs typeface="Arial"/>
+              </a:rPr>
+              <a:t>Инструменты разработки</a:t>
+            </a:r>
+          </a:p>
+        </p:txBody>
+      </p:sp>
+      <p:pic>
+        <p:nvPicPr>
+          <p:cNvPr id="1026" name="Picture 2" descr="Django SVG Vector Logos - Vector Logo Zone"/>
+          <p:cNvPicPr>
+            <a:picLocks noGrp="1" noChangeAspect="1" noChangeArrowheads="1"/>
+          </p:cNvPicPr>
+          <p:nvPr>
+            <p:ph idx="1"/>
+          </p:nvPr>
+        </p:nvPicPr>
+        <p:blipFill>
+          <a:blip r:embed="rId2">
+            <a:extLst>
+              <a:ext uri="{28A0092B-C50C-407E-A947-70E740481C1C}">
+                <a14:useLocalDpi xmlns:a14="http://schemas.microsoft.com/office/drawing/2010/main" val="0"/>
+              </a:ext>
+            </a:extLst>
+          </a:blip>
+          <a:srcRect/>
+          <a:stretch>
+            <a:fillRect/>
+          </a:stretch>
+        </p:blipFill>
+        <p:spPr bwMode="auto">
+          <a:xfrm>
+            <a:off x="1553612" y="1903779"/>
+            <a:ext cx="3381253" cy="1690627"/>
+          </a:xfrm>
+          <a:prstGeom prst="rect">
+            <a:avLst/>
+          </a:prstGeom>
+          <a:noFill/>
+          <a:extLst>
+            <a:ext uri="{909E8E84-426E-40DD-AFC4-6F175D3DCCD1}">
+              <a14:hiddenFill xmlns:a14="http://schemas.microsoft.com/office/drawing/2010/main">
+                <a:solidFill>
+                  <a:srgbClr val="FFFFFF"/>
+                </a:solidFill>
+              </a14:hiddenFill>
+            </a:ext>
+          </a:extLst>
+        </p:spPr>
+      </p:pic>
+      <p:pic>
+        <p:nvPicPr>
+          <p:cNvPr id="1032" name="Picture 8" descr="File:SQLite370.svg - Wikimedia Commons"/>
+          <p:cNvPicPr>
+            <a:picLocks noChangeAspect="1" noChangeArrowheads="1"/>
+          </p:cNvPicPr>
+          <p:nvPr/>
+        </p:nvPicPr>
+        <p:blipFill>
+          <a:blip r:embed="rId3">
+            <a:extLst>
+              <a:ext uri="{28A0092B-C50C-407E-A947-70E740481C1C}">
+                <a14:useLocalDpi xmlns:a14="http://schemas.microsoft.com/office/drawing/2010/main" val="0"/>
+              </a:ext>
+            </a:extLst>
+          </a:blip>
+          <a:srcRect/>
+          <a:stretch>
+            <a:fillRect/>
+          </a:stretch>
+        </p:blipFill>
+        <p:spPr bwMode="auto">
+          <a:xfrm>
+            <a:off x="838200" y="3807498"/>
+            <a:ext cx="4812079" cy="2278219"/>
+          </a:xfrm>
+          <a:prstGeom prst="rect">
+            <a:avLst/>
+          </a:prstGeom>
+          <a:noFill/>
+          <a:extLst>
+            <a:ext uri="{909E8E84-426E-40DD-AFC4-6F175D3DCCD1}">
+              <a14:hiddenFill xmlns:a14="http://schemas.microsoft.com/office/drawing/2010/main">
+                <a:solidFill>
+                  <a:srgbClr val="FFFFFF"/>
+                </a:solidFill>
+              </a14:hiddenFill>
+            </a:ext>
+          </a:extLst>
+        </p:spPr>
+      </p:pic>
+      <p:pic>
+        <p:nvPicPr>
+          <p:cNvPr id="1034" name="Picture 10" descr="Файл:Python logo and wordmark.svg — Википедия"/>
+          <p:cNvPicPr>
+            <a:picLocks noChangeAspect="1" noChangeArrowheads="1"/>
+          </p:cNvPicPr>
+          <p:nvPr/>
+        </p:nvPicPr>
+        <p:blipFill>
+          <a:blip r:embed="rId4" cstate="hqprint">
+            <a:extLst>
+              <a:ext uri="{28A0092B-C50C-407E-A947-70E740481C1C}">
+                <a14:useLocalDpi xmlns:a14="http://schemas.microsoft.com/office/drawing/2010/main" val="0"/>
+              </a:ext>
+            </a:extLst>
+          </a:blip>
+          <a:srcRect/>
+          <a:stretch>
+            <a:fillRect/>
+          </a:stretch>
+        </p:blipFill>
+        <p:spPr bwMode="auto">
+          <a:xfrm>
+            <a:off x="6306845" y="3042374"/>
+            <a:ext cx="4701504" cy="1393923"/>
+          </a:xfrm>
+          <a:prstGeom prst="rect">
+            <a:avLst/>
+          </a:prstGeom>
+          <a:noFill/>
+          <a:extLst>
+            <a:ext uri="{909E8E84-426E-40DD-AFC4-6F175D3DCCD1}">
+              <a14:hiddenFill xmlns:a14="http://schemas.microsoft.com/office/drawing/2010/main">
+                <a:solidFill>
+                  <a:srgbClr val="FFFFFF"/>
+                </a:solidFill>
+              </a14:hiddenFill>
+            </a:ext>
+          </a:extLst>
+        </p:spPr>
+      </p:pic>
+    </p:spTree>
+    <p:extLst>
+      <p:ext uri="{BB962C8B-B14F-4D97-AF65-F5344CB8AC3E}">
+        <p14:creationId xmlns:p14="http://schemas.microsoft.com/office/powerpoint/2010/main" val="4088614948"/>
+      </p:ext>
+    </p:extLst>
+  </p:cSld>
+  <p:clrMapOvr>
+    <a:masterClrMapping/>
+  </p:clrMapOvr>
+</p:sld>
+</file>
+
+<file path=ppt/slides/slide7.xml><?xml version="1.0" encoding="utf-8"?>
+<p:sld xmlns:a="http://schemas.openxmlformats.org/drawingml/2006/main" xmlns:r="http://schemas.openxmlformats.org/officeDocument/2006/relationships" xmlns:p="http://schemas.openxmlformats.org/presentationml/2006/main">
+  <p:cSld>
+    <p:spTree>
+      <p:nvGrpSpPr>
+        <p:cNvPr id="1" name=""/>
+        <p:cNvGrpSpPr/>
+        <p:nvPr/>
+      </p:nvGrpSpPr>
+      <p:grpSpPr>
+        <a:xfrm>
+          <a:off x="0" y="0"/>
+          <a:ext cx="0" cy="0"/>
+          <a:chOff x="0" y="0"/>
+          <a:chExt cx="0" cy="0"/>
+        </a:xfrm>
+      </p:grpSpPr>
+      <p:sp>
+        <p:nvSpPr>
+          <p:cNvPr id="2" name="Заголовок 1"/>
+          <p:cNvSpPr>
+            <a:spLocks noGrp="1"/>
+          </p:cNvSpPr>
+          <p:nvPr>
+            <p:ph type="title"/>
+          </p:nvPr>
+        </p:nvSpPr>
+        <p:spPr>
+          <a:xfrm>
+            <a:off x="290146" y="321958"/>
+            <a:ext cx="10436469" cy="661987"/>
+          </a:xfrm>
+        </p:spPr>
+        <p:txBody>
+          <a:bodyPr>
+            <a:normAutofit fontScale="90000"/>
+          </a:bodyPr>
+          <a:lstStyle/>
+          <a:p>
+            <a:pPr algn="ctr"/>
+            <a:r>
+              <a:rPr lang="ru-RU" dirty="0">
+                <a:latin typeface="Arial"/>
+                <a:ea typeface="Arial"/>
+                <a:cs typeface="Arial"/>
+              </a:rPr>
+              <a:t>Модель классов</a:t>
+            </a:r>
+          </a:p>
+        </p:txBody>
+      </p:sp>
+      <p:pic>
+        <p:nvPicPr>
+          <p:cNvPr id="4" name="Объект 3"/>
+          <p:cNvPicPr>
+            <a:picLocks noGrp="1" noChangeAspect="1"/>
+          </p:cNvPicPr>
+          <p:nvPr>
+            <p:ph idx="1"/>
+          </p:nvPr>
+        </p:nvPicPr>
+        <p:blipFill rotWithShape="1">
+          <a:blip r:embed="rId2" cstate="hqprint">
+            <a:extLst>
+              <a:ext uri="{28A0092B-C50C-407E-A947-70E740481C1C}">
+                <a14:useLocalDpi xmlns:a14="http://schemas.microsoft.com/office/drawing/2010/main" val="0"/>
+              </a:ext>
+            </a:extLst>
+          </a:blip>
+          <a:srcRect t="42739"/>
+          <a:stretch/>
+        </p:blipFill>
+        <p:spPr>
+          <a:xfrm>
+            <a:off x="498576" y="1063868"/>
+            <a:ext cx="11430741" cy="4765432"/>
+          </a:xfrm>
+        </p:spPr>
+      </p:pic>
+    </p:spTree>
+    <p:extLst>
+      <p:ext uri="{BB962C8B-B14F-4D97-AF65-F5344CB8AC3E}">
+        <p14:creationId xmlns:p14="http://schemas.microsoft.com/office/powerpoint/2010/main" val="1372278703"/>
+      </p:ext>
+    </p:extLst>
+  </p:cSld>
+  <p:clrMapOvr>
+    <a:masterClrMapping/>
+  </p:clrMapOvr>
+</p:sld>
+</file>
+
+<file path=ppt/slides/slide8.xml><?xml version="1.0" encoding="utf-8"?>
+<p:sld xmlns:a="http://schemas.openxmlformats.org/drawingml/2006/main" xmlns:r="http://schemas.openxmlformats.org/officeDocument/2006/relationships" xmlns:p="http://schemas.openxmlformats.org/presentationml/2006/main">
+  <p:cSld>
+    <p:spTree>
+      <p:nvGrpSpPr>
+        <p:cNvPr id="1" name=""/>
+        <p:cNvGrpSpPr/>
+        <p:nvPr/>
+      </p:nvGrpSpPr>
+      <p:grpSpPr>
+        <a:xfrm>
+          <a:off x="0" y="0"/>
+          <a:ext cx="0" cy="0"/>
+          <a:chOff x="0" y="0"/>
+          <a:chExt cx="0" cy="0"/>
+        </a:xfrm>
+      </p:grpSpPr>
+      <p:sp>
+        <p:nvSpPr>
+          <p:cNvPr id="4" name="Google Shape;159;g890fc14cac_0_83"/>
+          <p:cNvSpPr txBox="1">
+            <a:spLocks/>
+          </p:cNvSpPr>
+          <p:nvPr/>
+        </p:nvSpPr>
+        <p:spPr>
+          <a:xfrm>
+            <a:off x="1865832" y="1833009"/>
+            <a:ext cx="9144000" cy="1194900"/>
+          </a:xfrm>
+          <a:prstGeom prst="rect">
+            <a:avLst/>
+          </a:prstGeom>
+          <a:noFill/>
+          <a:ln>
+            <a:noFill/>
+          </a:ln>
+        </p:spPr>
+        <p:txBody>
+          <a:bodyPr spcFirstLastPara="1" wrap="square" lIns="91425" tIns="45700" rIns="91425" bIns="45700" anchor="b" anchorCtr="0">
+            <a:noAutofit/>
+          </a:bodyPr>
+          <a:lstStyle>
+            <a:defPPr marR="0" lvl="0" algn="l" rtl="0">
+              <a:lnSpc>
+                <a:spcPct val="100000"/>
+              </a:lnSpc>
+              <a:spcBef>
+                <a:spcPts val="0"/>
+              </a:spcBef>
+              <a:spcAft>
+                <a:spcPts val="0"/>
+              </a:spcAft>
+            </a:defPPr>
+            <a:lvl1pPr marR="0" lvl="0" algn="l" rtl="0">
+              <a:lnSpc>
+                <a:spcPct val="90000"/>
+              </a:lnSpc>
+              <a:spcBef>
+                <a:spcPts val="0"/>
+              </a:spcBef>
+              <a:spcAft>
+                <a:spcPts val="0"/>
+              </a:spcAft>
+              <a:buClr>
+                <a:schemeClr val="dk1"/>
+              </a:buClr>
+              <a:buSzPts val="1800"/>
+              <a:buFont typeface="Calibri"/>
+              <a:buNone/>
+              <a:defRPr sz="4400" b="0" i="0" u="none" strike="noStrike" cap="none">
+                <a:solidFill>
+                  <a:schemeClr val="dk1"/>
+                </a:solidFill>
+                <a:latin typeface="Calibri"/>
+                <a:ea typeface="Calibri"/>
+                <a:cs typeface="Calibri"/>
+                <a:sym typeface="Calibri"/>
+              </a:defRPr>
+            </a:lvl1pPr>
+            <a:lvl2pPr marR="0" lvl="1" algn="l" rtl="0">
+              <a:lnSpc>
+                <a:spcPct val="100000"/>
+              </a:lnSpc>
+              <a:spcBef>
+                <a:spcPts val="0"/>
+              </a:spcBef>
+              <a:spcAft>
+                <a:spcPts val="0"/>
+              </a:spcAft>
+              <a:buClr>
+                <a:srgbClr val="000000"/>
+              </a:buClr>
+              <a:buSzPts val="1400"/>
+              <a:buFont typeface="Arial"/>
+              <a:buNone/>
+              <a:defRPr sz="1800" b="0" i="0" u="none" strike="noStrike" cap="none">
+                <a:solidFill>
+                  <a:srgbClr val="000000"/>
+                </a:solidFill>
+                <a:latin typeface="Arial"/>
+                <a:ea typeface="Arial"/>
+                <a:cs typeface="Arial"/>
+                <a:sym typeface="Arial"/>
+              </a:defRPr>
+            </a:lvl2pPr>
+            <a:lvl3pPr marR="0" lvl="2" algn="l" rtl="0">
+              <a:lnSpc>
+                <a:spcPct val="100000"/>
+              </a:lnSpc>
+              <a:spcBef>
+                <a:spcPts val="0"/>
+              </a:spcBef>
+              <a:spcAft>
+                <a:spcPts val="0"/>
+              </a:spcAft>
+              <a:buClr>
+                <a:srgbClr val="000000"/>
+              </a:buClr>
+              <a:buSzPts val="1400"/>
+              <a:buFont typeface="Arial"/>
+              <a:buNone/>
+              <a:defRPr sz="1800" b="0" i="0" u="none" strike="noStrike" cap="none">
+                <a:solidFill>
+                  <a:srgbClr val="000000"/>
+                </a:solidFill>
+                <a:latin typeface="Arial"/>
+                <a:ea typeface="Arial"/>
+                <a:cs typeface="Arial"/>
+                <a:sym typeface="Arial"/>
+              </a:defRPr>
+            </a:lvl3pPr>
+            <a:lvl4pPr marR="0" lvl="3" algn="l" rtl="0">
+              <a:lnSpc>
+                <a:spcPct val="100000"/>
+              </a:lnSpc>
+              <a:spcBef>
+                <a:spcPts val="0"/>
+              </a:spcBef>
+              <a:spcAft>
+                <a:spcPts val="0"/>
+              </a:spcAft>
+              <a:buClr>
+                <a:srgbClr val="000000"/>
+              </a:buClr>
+              <a:buSzPts val="1400"/>
+              <a:buFont typeface="Arial"/>
+              <a:buNone/>
+              <a:defRPr sz="1800" b="0" i="0" u="none" strike="noStrike" cap="none">
+                <a:solidFill>
+                  <a:srgbClr val="000000"/>
+                </a:solidFill>
+                <a:latin typeface="Arial"/>
+                <a:ea typeface="Arial"/>
+                <a:cs typeface="Arial"/>
+                <a:sym typeface="Arial"/>
+              </a:defRPr>
+            </a:lvl4pPr>
+            <a:lvl5pPr marR="0" lvl="4" algn="l" rtl="0">
+              <a:lnSpc>
+                <a:spcPct val="100000"/>
+              </a:lnSpc>
+              <a:spcBef>
+                <a:spcPts val="0"/>
+              </a:spcBef>
+              <a:spcAft>
+                <a:spcPts val="0"/>
+              </a:spcAft>
+              <a:buClr>
+                <a:srgbClr val="000000"/>
+              </a:buClr>
+              <a:buSzPts val="1400"/>
+              <a:buFont typeface="Arial"/>
+              <a:buNone/>
+              <a:defRPr sz="1800" b="0" i="0" u="none" strike="noStrike" cap="none">
+                <a:solidFill>
+                  <a:srgbClr val="000000"/>
+                </a:solidFill>
+                <a:latin typeface="Arial"/>
+                <a:ea typeface="Arial"/>
+                <a:cs typeface="Arial"/>
+                <a:sym typeface="Arial"/>
+              </a:defRPr>
+            </a:lvl5pPr>
+            <a:lvl6pPr marR="0" lvl="5" algn="l" rtl="0">
+              <a:lnSpc>
+                <a:spcPct val="100000"/>
+              </a:lnSpc>
+              <a:spcBef>
+                <a:spcPts val="0"/>
+              </a:spcBef>
+              <a:spcAft>
+                <a:spcPts val="0"/>
+              </a:spcAft>
+              <a:buClr>
+                <a:srgbClr val="000000"/>
+              </a:buClr>
+              <a:buSzPts val="1400"/>
+              <a:buFont typeface="Arial"/>
+              <a:buNone/>
+              <a:defRPr sz="1800" b="0" i="0" u="none" strike="noStrike" cap="none">
+                <a:solidFill>
+                  <a:srgbClr val="000000"/>
+                </a:solidFill>
+                <a:latin typeface="Arial"/>
+                <a:ea typeface="Arial"/>
+                <a:cs typeface="Arial"/>
+                <a:sym typeface="Arial"/>
+              </a:defRPr>
+            </a:lvl6pPr>
+            <a:lvl7pPr marR="0" lvl="6" algn="l" rtl="0">
+              <a:lnSpc>
+                <a:spcPct val="100000"/>
+              </a:lnSpc>
+              <a:spcBef>
+                <a:spcPts val="0"/>
+              </a:spcBef>
+              <a:spcAft>
+                <a:spcPts val="0"/>
+              </a:spcAft>
+              <a:buClr>
+                <a:srgbClr val="000000"/>
+              </a:buClr>
+              <a:buSzPts val="1400"/>
+              <a:buFont typeface="Arial"/>
+              <a:buNone/>
+              <a:defRPr sz="1800" b="0" i="0" u="none" strike="noStrike" cap="none">
+                <a:solidFill>
+                  <a:srgbClr val="000000"/>
+                </a:solidFill>
+                <a:latin typeface="Arial"/>
+                <a:ea typeface="Arial"/>
+                <a:cs typeface="Arial"/>
+                <a:sym typeface="Arial"/>
+              </a:defRPr>
+            </a:lvl7pPr>
+            <a:lvl8pPr marR="0" lvl="7" algn="l" rtl="0">
+              <a:lnSpc>
+                <a:spcPct val="100000"/>
+              </a:lnSpc>
+              <a:spcBef>
+                <a:spcPts val="0"/>
+              </a:spcBef>
+              <a:spcAft>
+                <a:spcPts val="0"/>
+              </a:spcAft>
+              <a:buClr>
+                <a:srgbClr val="000000"/>
+              </a:buClr>
+              <a:buSzPts val="1400"/>
+              <a:buFont typeface="Arial"/>
+              <a:buNone/>
+              <a:defRPr sz="1800" b="0" i="0" u="none" strike="noStrike" cap="none">
+                <a:solidFill>
+                  <a:srgbClr val="000000"/>
+                </a:solidFill>
+                <a:latin typeface="Arial"/>
+                <a:ea typeface="Arial"/>
+                <a:cs typeface="Arial"/>
+                <a:sym typeface="Arial"/>
+              </a:defRPr>
+            </a:lvl8pPr>
+            <a:lvl9pPr marR="0" lvl="8" algn="l" rtl="0">
+              <a:lnSpc>
+                <a:spcPct val="100000"/>
+              </a:lnSpc>
+              <a:spcBef>
+                <a:spcPts val="0"/>
+              </a:spcBef>
+              <a:spcAft>
+                <a:spcPts val="0"/>
+              </a:spcAft>
+              <a:buClr>
+                <a:srgbClr val="000000"/>
+              </a:buClr>
+              <a:buSzPts val="1400"/>
+              <a:buFont typeface="Arial"/>
+              <a:buNone/>
+              <a:defRPr sz="1800" b="0" i="0" u="none" strike="noStrike" cap="none">
+                <a:solidFill>
+                  <a:srgbClr val="000000"/>
+                </a:solidFill>
+                <a:latin typeface="Arial"/>
+                <a:ea typeface="Arial"/>
+                <a:cs typeface="Arial"/>
+                <a:sym typeface="Arial"/>
+              </a:defRPr>
+            </a:lvl9pPr>
+          </a:lstStyle>
+          <a:p>
+            <a:pPr algn="ctr">
+              <a:lnSpc>
+                <a:spcPct val="100000"/>
+              </a:lnSpc>
+              <a:spcBef>
+                <a:spcPts val="1200"/>
+              </a:spcBef>
+              <a:buSzPts val="1100"/>
+            </a:pPr>
+            <a:r>
+              <a:rPr lang="ru-RU" sz="3200" dirty="0">
+                <a:latin typeface="Times New Roman"/>
+                <a:ea typeface="Times New Roman"/>
+                <a:cs typeface="Times New Roman"/>
+                <a:sym typeface="Times New Roman"/>
+              </a:rPr>
+              <a:t>Автоматизация составления рабочих программ дисциплин</a:t>
+            </a:r>
+          </a:p>
+        </p:txBody>
+      </p:sp>
+      <p:sp>
+        <p:nvSpPr>
+          <p:cNvPr id="5" name="Google Shape;160;g890fc14cac_0_83"/>
+          <p:cNvSpPr txBox="1">
+            <a:spLocks/>
+          </p:cNvSpPr>
+          <p:nvPr/>
+        </p:nvSpPr>
+        <p:spPr>
+          <a:xfrm>
+            <a:off x="3008832" y="3079765"/>
+            <a:ext cx="6858000" cy="695400"/>
+          </a:xfrm>
+          <a:prstGeom prst="rect">
+            <a:avLst/>
+          </a:prstGeom>
+          <a:noFill/>
+          <a:ln>
+            <a:noFill/>
+          </a:ln>
+        </p:spPr>
+        <p:txBody>
+          <a:bodyPr spcFirstLastPara="1" wrap="square" lIns="91425" tIns="45700" rIns="91425" bIns="45700" anchor="t" anchorCtr="0">
+            <a:noAutofit/>
+          </a:bodyPr>
+          <a:lstStyle>
+            <a:defPPr marR="0" lvl="0" algn="l" rtl="0">
+              <a:lnSpc>
+                <a:spcPct val="100000"/>
+              </a:lnSpc>
+              <a:spcBef>
+                <a:spcPts val="0"/>
+              </a:spcBef>
+              <a:spcAft>
+                <a:spcPts val="0"/>
+              </a:spcAft>
+            </a:defPPr>
+            <a:lvl1pPr marL="457200" marR="0" lvl="0" indent="-342900" algn="l" rtl="0">
+              <a:lnSpc>
+                <a:spcPct val="90000"/>
+              </a:lnSpc>
+              <a:spcBef>
+                <a:spcPts val="1000"/>
+              </a:spcBef>
+              <a:spcAft>
+                <a:spcPts val="0"/>
+              </a:spcAft>
+              <a:buClr>
+                <a:schemeClr val="dk1"/>
+              </a:buClr>
+              <a:buSzPts val="1800"/>
+              <a:buFont typeface="Arial"/>
+              <a:buChar char="•"/>
+              <a:defRPr sz="2800" b="0" i="0" u="none" strike="noStrike" cap="none">
+                <a:solidFill>
+                  <a:schemeClr val="dk1"/>
+                </a:solidFill>
+                <a:latin typeface="Calibri"/>
+                <a:ea typeface="Calibri"/>
+                <a:cs typeface="Calibri"/>
+                <a:sym typeface="Calibri"/>
+              </a:defRPr>
+            </a:lvl1pPr>
+            <a:lvl2pPr marL="914400" marR="0" lvl="1" indent="-342900" algn="l" rtl="0">
+              <a:lnSpc>
+                <a:spcPct val="90000"/>
+              </a:lnSpc>
+              <a:spcBef>
+                <a:spcPts val="500"/>
+              </a:spcBef>
+              <a:spcAft>
+                <a:spcPts val="0"/>
+              </a:spcAft>
+              <a:buClr>
+                <a:schemeClr val="dk1"/>
+              </a:buClr>
+              <a:buSzPts val="1800"/>
+              <a:buFont typeface="Arial"/>
+              <a:buChar char="•"/>
+              <a:defRPr sz="2400" b="0" i="0" u="none" strike="noStrike" cap="none">
+                <a:solidFill>
+                  <a:schemeClr val="dk1"/>
+                </a:solidFill>
+                <a:latin typeface="Calibri"/>
+                <a:ea typeface="Calibri"/>
+                <a:cs typeface="Calibri"/>
+                <a:sym typeface="Calibri"/>
+              </a:defRPr>
+            </a:lvl2pPr>
+            <a:lvl3pPr marL="1371600" marR="0" lvl="2" indent="-342900" algn="l" rtl="0">
+              <a:lnSpc>
+                <a:spcPct val="90000"/>
+              </a:lnSpc>
+              <a:spcBef>
+                <a:spcPts val="500"/>
+              </a:spcBef>
+              <a:spcAft>
+                <a:spcPts val="0"/>
+              </a:spcAft>
+              <a:buClr>
+                <a:schemeClr val="dk1"/>
+              </a:buClr>
+              <a:buSzPts val="1800"/>
+              <a:buFont typeface="Arial"/>
+              <a:buChar char="•"/>
+              <a:defRPr sz="2000" b="0" i="0" u="none" strike="noStrike" cap="none">
+                <a:solidFill>
+                  <a:schemeClr val="dk1"/>
+                </a:solidFill>
+                <a:latin typeface="Calibri"/>
+                <a:ea typeface="Calibri"/>
+                <a:cs typeface="Calibri"/>
+                <a:sym typeface="Calibri"/>
+              </a:defRPr>
+            </a:lvl3pPr>
+            <a:lvl4pPr marL="1828800" marR="0" lvl="3" indent="-342900" algn="l" rtl="0">
+              <a:lnSpc>
+                <a:spcPct val="90000"/>
+              </a:lnSpc>
+              <a:spcBef>
+                <a:spcPts val="500"/>
+              </a:spcBef>
+              <a:spcAft>
+                <a:spcPts val="0"/>
+              </a:spcAft>
+              <a:buClr>
+                <a:schemeClr val="dk1"/>
+              </a:buClr>
+              <a:buSzPts val="1800"/>
+              <a:buFont typeface="Arial"/>
+              <a:buChar char="•"/>
+              <a:defRPr sz="1800" b="0" i="0" u="none" strike="noStrike" cap="none">
+                <a:solidFill>
+                  <a:schemeClr val="dk1"/>
+                </a:solidFill>
+                <a:latin typeface="Calibri"/>
+                <a:ea typeface="Calibri"/>
+                <a:cs typeface="Calibri"/>
+                <a:sym typeface="Calibri"/>
+              </a:defRPr>
+            </a:lvl4pPr>
+            <a:lvl5pPr marL="2286000" marR="0" lvl="4" indent="-342900" algn="l" rtl="0">
+              <a:lnSpc>
+                <a:spcPct val="90000"/>
+              </a:lnSpc>
+              <a:spcBef>
+                <a:spcPts val="500"/>
+              </a:spcBef>
+              <a:spcAft>
+                <a:spcPts val="0"/>
+              </a:spcAft>
+              <a:buClr>
+                <a:schemeClr val="dk1"/>
+              </a:buClr>
+              <a:buSzPts val="1800"/>
+              <a:buFont typeface="Arial"/>
+              <a:buChar char="•"/>
+              <a:defRPr sz="1800" b="0" i="0" u="none" strike="noStrike" cap="none">
+                <a:solidFill>
+                  <a:schemeClr val="dk1"/>
+                </a:solidFill>
+                <a:latin typeface="Calibri"/>
+                <a:ea typeface="Calibri"/>
+                <a:cs typeface="Calibri"/>
+                <a:sym typeface="Calibri"/>
+              </a:defRPr>
+            </a:lvl5pPr>
+            <a:lvl6pPr marL="2743200" marR="0" lvl="5" indent="-342900" algn="l" rtl="0">
+              <a:lnSpc>
+                <a:spcPct val="90000"/>
+              </a:lnSpc>
+              <a:spcBef>
+                <a:spcPts val="500"/>
+              </a:spcBef>
+              <a:spcAft>
+                <a:spcPts val="0"/>
+              </a:spcAft>
+              <a:buClr>
+                <a:schemeClr val="dk1"/>
+              </a:buClr>
+              <a:buSzPts val="1800"/>
+              <a:buFont typeface="Arial"/>
+              <a:buChar char="•"/>
+              <a:defRPr sz="1800" b="0" i="0" u="none" strike="noStrike" cap="none">
+                <a:solidFill>
+                  <a:schemeClr val="dk1"/>
+                </a:solidFill>
+                <a:latin typeface="Calibri"/>
+                <a:ea typeface="Calibri"/>
+                <a:cs typeface="Calibri"/>
+                <a:sym typeface="Calibri"/>
+              </a:defRPr>
+            </a:lvl6pPr>
+            <a:lvl7pPr marL="3200400" marR="0" lvl="6" indent="-342900" algn="l" rtl="0">
+              <a:lnSpc>
+                <a:spcPct val="90000"/>
+              </a:lnSpc>
+              <a:spcBef>
+                <a:spcPts val="500"/>
+              </a:spcBef>
+              <a:spcAft>
+                <a:spcPts val="0"/>
+              </a:spcAft>
+              <a:buClr>
+                <a:schemeClr val="dk1"/>
+              </a:buClr>
+              <a:buSzPts val="1800"/>
+              <a:buFont typeface="Arial"/>
+              <a:buChar char="•"/>
+              <a:defRPr sz="1800" b="0" i="0" u="none" strike="noStrike" cap="none">
+                <a:solidFill>
+                  <a:schemeClr val="dk1"/>
+                </a:solidFill>
+                <a:latin typeface="Calibri"/>
+                <a:ea typeface="Calibri"/>
+                <a:cs typeface="Calibri"/>
+                <a:sym typeface="Calibri"/>
+              </a:defRPr>
+            </a:lvl7pPr>
+            <a:lvl8pPr marL="3657600" marR="0" lvl="7" indent="-342900" algn="l" rtl="0">
+              <a:lnSpc>
+                <a:spcPct val="90000"/>
+              </a:lnSpc>
+              <a:spcBef>
+                <a:spcPts val="500"/>
+              </a:spcBef>
+              <a:spcAft>
+                <a:spcPts val="0"/>
+              </a:spcAft>
+              <a:buClr>
+                <a:schemeClr val="dk1"/>
+              </a:buClr>
+              <a:buSzPts val="1800"/>
+              <a:buFont typeface="Arial"/>
+              <a:buChar char="•"/>
+              <a:defRPr sz="1800" b="0" i="0" u="none" strike="noStrike" cap="none">
+                <a:solidFill>
+                  <a:schemeClr val="dk1"/>
+                </a:solidFill>
+                <a:latin typeface="Calibri"/>
+                <a:ea typeface="Calibri"/>
+                <a:cs typeface="Calibri"/>
+                <a:sym typeface="Calibri"/>
+              </a:defRPr>
+            </a:lvl8pPr>
+            <a:lvl9pPr marL="4114800" marR="0" lvl="8" indent="-342900" algn="l" rtl="0">
+              <a:lnSpc>
+                <a:spcPct val="90000"/>
+              </a:lnSpc>
+              <a:spcBef>
+                <a:spcPts val="500"/>
+              </a:spcBef>
+              <a:spcAft>
+                <a:spcPts val="0"/>
+              </a:spcAft>
+              <a:buClr>
+                <a:schemeClr val="dk1"/>
+              </a:buClr>
+              <a:buSzPts val="1800"/>
+              <a:buFont typeface="Arial"/>
+              <a:buChar char="•"/>
+              <a:defRPr sz="1800" b="0" i="0" u="none" strike="noStrike" cap="none">
+                <a:solidFill>
+                  <a:schemeClr val="dk1"/>
+                </a:solidFill>
+                <a:latin typeface="Calibri"/>
+                <a:ea typeface="Calibri"/>
+                <a:cs typeface="Calibri"/>
+                <a:sym typeface="Calibri"/>
+              </a:defRPr>
+            </a:lvl9pPr>
+          </a:lstStyle>
+          <a:p>
+            <a:pPr marL="0" indent="0" algn="ctr">
+              <a:lnSpc>
+                <a:spcPct val="100000"/>
+              </a:lnSpc>
+              <a:spcBef>
+                <a:spcPts val="0"/>
+              </a:spcBef>
+              <a:buSzPts val="1600"/>
+              <a:buNone/>
+            </a:pPr>
+            <a:r>
+              <a:rPr lang="ru-RU" sz="1600" dirty="0">
+                <a:latin typeface="Times New Roman" panose="02020603050405020304" pitchFamily="18" charset="0"/>
+                <a:ea typeface="Arial"/>
+                <a:cs typeface="Times New Roman" panose="02020603050405020304" pitchFamily="18" charset="0"/>
+                <a:sym typeface="Arial"/>
+              </a:rPr>
+              <a:t>ВЫПУСКНАЯ КВАЛИФИКАЦИОННАЯ РАБОТА</a:t>
+            </a:r>
+            <a:endParaRPr lang="ru-RU" dirty="0">
+              <a:latin typeface="Times New Roman" panose="02020603050405020304" pitchFamily="18" charset="0"/>
+              <a:ea typeface="Arial"/>
+              <a:cs typeface="Times New Roman" panose="02020603050405020304" pitchFamily="18" charset="0"/>
+              <a:sym typeface="Arial"/>
+            </a:endParaRPr>
+          </a:p>
+          <a:p>
+            <a:pPr marL="0" indent="0" algn="ctr">
+              <a:lnSpc>
+                <a:spcPct val="100000"/>
+              </a:lnSpc>
+              <a:spcBef>
+                <a:spcPts val="0"/>
+              </a:spcBef>
+              <a:buSzPts val="1600"/>
+              <a:buNone/>
+            </a:pPr>
+            <a:r>
+              <a:rPr lang="ru-RU" sz="1600" dirty="0">
+                <a:latin typeface="Times New Roman" panose="02020603050405020304" pitchFamily="18" charset="0"/>
+                <a:ea typeface="Arial"/>
+                <a:cs typeface="Times New Roman" panose="02020603050405020304" pitchFamily="18" charset="0"/>
+                <a:sym typeface="Arial"/>
+              </a:rPr>
+              <a:t>Направление подготовки: 02.03.02 «Фундаментальная информатика и </a:t>
+            </a:r>
+          </a:p>
+          <a:p>
+            <a:pPr marL="0" indent="0" algn="ctr">
+              <a:lnSpc>
+                <a:spcPct val="100000"/>
+              </a:lnSpc>
+              <a:spcBef>
+                <a:spcPts val="0"/>
+              </a:spcBef>
+              <a:buSzPts val="1600"/>
+              <a:buNone/>
+            </a:pPr>
+            <a:r>
+              <a:rPr lang="ru-RU" sz="1600" dirty="0">
+                <a:latin typeface="Times New Roman" panose="02020603050405020304" pitchFamily="18" charset="0"/>
+                <a:ea typeface="Arial"/>
+                <a:cs typeface="Times New Roman" panose="02020603050405020304" pitchFamily="18" charset="0"/>
+                <a:sym typeface="Arial"/>
+              </a:rPr>
+              <a:t>информационные технологии» </a:t>
+            </a:r>
+          </a:p>
+        </p:txBody>
+      </p:sp>
+      <p:sp>
+        <p:nvSpPr>
+          <p:cNvPr id="6" name="Google Shape;161;g890fc14cac_0_83"/>
+          <p:cNvSpPr txBox="1"/>
+          <p:nvPr/>
+        </p:nvSpPr>
+        <p:spPr>
+          <a:xfrm>
+            <a:off x="1524001" y="194753"/>
+            <a:ext cx="9144000" cy="1238700"/>
+          </a:xfrm>
+          <a:prstGeom prst="rect">
+            <a:avLst/>
+          </a:prstGeom>
+          <a:noFill/>
+          <a:ln>
+            <a:noFill/>
+          </a:ln>
+        </p:spPr>
+        <p:txBody>
+          <a:bodyPr spcFirstLastPara="1" wrap="square" lIns="91425" tIns="45700" rIns="91425" bIns="45700" anchor="t" anchorCtr="0">
+            <a:noAutofit/>
+          </a:bodyPr>
+          <a:lstStyle/>
+          <a:p>
+            <a:pPr algn="ctr"/>
+            <a:r>
+              <a:rPr lang="ru-RU" sz="1600" dirty="0">
+                <a:solidFill>
+                  <a:schemeClr val="dk1"/>
+                </a:solidFill>
+                <a:latin typeface="Times New Roman" panose="02020603050405020304" pitchFamily="18" charset="0"/>
+                <a:cs typeface="Times New Roman" panose="02020603050405020304" pitchFamily="18" charset="0"/>
+              </a:rPr>
+              <a:t>Министерство науки и высшего образования Российской Федерации</a:t>
+            </a:r>
+            <a:endParaRPr dirty="0">
+              <a:latin typeface="Times New Roman" panose="02020603050405020304" pitchFamily="18" charset="0"/>
+              <a:cs typeface="Times New Roman" panose="02020603050405020304" pitchFamily="18" charset="0"/>
+            </a:endParaRPr>
+          </a:p>
+          <a:p>
+            <a:pPr algn="ctr"/>
+            <a:r>
+              <a:rPr lang="ru-RU" sz="1600" dirty="0">
+                <a:solidFill>
+                  <a:schemeClr val="dk1"/>
+                </a:solidFill>
+                <a:latin typeface="Times New Roman" panose="02020603050405020304" pitchFamily="18" charset="0"/>
+                <a:cs typeface="Times New Roman" panose="02020603050405020304" pitchFamily="18" charset="0"/>
+              </a:rPr>
+              <a:t>ФГАОУ ВО «Северо-Восточный федеральный университет имени М.К. </a:t>
+            </a:r>
+            <a:r>
+              <a:rPr lang="ru-RU" sz="1600" dirty="0" err="1">
+                <a:solidFill>
+                  <a:schemeClr val="dk1"/>
+                </a:solidFill>
+                <a:latin typeface="Times New Roman" panose="02020603050405020304" pitchFamily="18" charset="0"/>
+                <a:cs typeface="Times New Roman" panose="02020603050405020304" pitchFamily="18" charset="0"/>
+              </a:rPr>
+              <a:t>Аммосова</a:t>
+            </a:r>
+            <a:r>
+              <a:rPr lang="ru-RU" sz="1600" dirty="0">
+                <a:solidFill>
+                  <a:schemeClr val="dk1"/>
+                </a:solidFill>
+                <a:latin typeface="Times New Roman" panose="02020603050405020304" pitchFamily="18" charset="0"/>
+                <a:cs typeface="Times New Roman" panose="02020603050405020304" pitchFamily="18" charset="0"/>
+              </a:rPr>
+              <a:t>»</a:t>
+            </a:r>
+            <a:endParaRPr dirty="0">
+              <a:latin typeface="Times New Roman" panose="02020603050405020304" pitchFamily="18" charset="0"/>
+              <a:cs typeface="Times New Roman" panose="02020603050405020304" pitchFamily="18" charset="0"/>
+            </a:endParaRPr>
+          </a:p>
+          <a:p>
+            <a:pPr algn="ctr"/>
+            <a:r>
+              <a:rPr lang="ru-RU" sz="1600" dirty="0">
+                <a:solidFill>
+                  <a:schemeClr val="dk1"/>
+                </a:solidFill>
+                <a:latin typeface="Times New Roman" panose="02020603050405020304" pitchFamily="18" charset="0"/>
+                <a:cs typeface="Times New Roman" panose="02020603050405020304" pitchFamily="18" charset="0"/>
+              </a:rPr>
+              <a:t>Институт математики и информатики</a:t>
+            </a:r>
+            <a:endParaRPr dirty="0">
+              <a:latin typeface="Times New Roman" panose="02020603050405020304" pitchFamily="18" charset="0"/>
+              <a:cs typeface="Times New Roman" panose="02020603050405020304" pitchFamily="18" charset="0"/>
+            </a:endParaRPr>
+          </a:p>
+          <a:p>
+            <a:pPr algn="ctr"/>
+            <a:r>
+              <a:rPr lang="ru-RU" sz="1600" dirty="0">
+                <a:solidFill>
+                  <a:schemeClr val="dk1"/>
+                </a:solidFill>
+                <a:latin typeface="Times New Roman" panose="02020603050405020304" pitchFamily="18" charset="0"/>
+                <a:cs typeface="Times New Roman" panose="02020603050405020304" pitchFamily="18" charset="0"/>
+              </a:rPr>
+              <a:t>Кафедра «Информационные технологии»</a:t>
+            </a:r>
+            <a:endParaRPr dirty="0">
+              <a:latin typeface="Times New Roman" panose="02020603050405020304" pitchFamily="18" charset="0"/>
+              <a:cs typeface="Times New Roman" panose="02020603050405020304" pitchFamily="18" charset="0"/>
+            </a:endParaRPr>
+          </a:p>
+          <a:p>
+            <a:pPr algn="ctr"/>
+            <a:endParaRPr sz="1050" dirty="0">
+              <a:solidFill>
+                <a:schemeClr val="dk1"/>
+              </a:solidFill>
+              <a:latin typeface="Times New Roman" panose="02020603050405020304" pitchFamily="18" charset="0"/>
+              <a:ea typeface="Times New Roman"/>
+              <a:cs typeface="Times New Roman" panose="02020603050405020304" pitchFamily="18" charset="0"/>
+              <a:sym typeface="Times New Roman"/>
+            </a:endParaRPr>
+          </a:p>
+        </p:txBody>
+      </p:sp>
+      <p:sp>
+        <p:nvSpPr>
+          <p:cNvPr id="7" name="Google Shape;162;g890fc14cac_0_83"/>
+          <p:cNvSpPr txBox="1"/>
+          <p:nvPr/>
+        </p:nvSpPr>
+        <p:spPr>
+          <a:xfrm>
+            <a:off x="7080739" y="4305504"/>
+            <a:ext cx="3200400" cy="1717344"/>
+          </a:xfrm>
+          <a:prstGeom prst="rect">
+            <a:avLst/>
+          </a:prstGeom>
+          <a:noFill/>
+          <a:ln>
+            <a:noFill/>
+          </a:ln>
+        </p:spPr>
+        <p:txBody>
+          <a:bodyPr spcFirstLastPara="1" wrap="square" lIns="91425" tIns="45700" rIns="91425" bIns="45700" anchor="t" anchorCtr="0">
+            <a:noAutofit/>
+          </a:bodyPr>
+          <a:lstStyle/>
+          <a:p>
+            <a:pPr>
+              <a:buClr>
+                <a:schemeClr val="dk1"/>
+              </a:buClr>
+              <a:buSzPts val="1600"/>
+            </a:pPr>
+            <a:r>
+              <a:rPr lang="ru-RU" sz="1600" dirty="0">
+                <a:solidFill>
+                  <a:schemeClr val="dk1"/>
+                </a:solidFill>
+                <a:latin typeface="Times New Roman" panose="02020603050405020304" pitchFamily="18" charset="0"/>
+                <a:cs typeface="Times New Roman" panose="02020603050405020304" pitchFamily="18" charset="0"/>
+              </a:rPr>
+              <a:t>Выполнил: студент </a:t>
+            </a:r>
+            <a:r>
+              <a:rPr lang="en-US" sz="1600" dirty="0">
+                <a:solidFill>
+                  <a:schemeClr val="dk1"/>
+                </a:solidFill>
+                <a:latin typeface="Times New Roman" panose="02020603050405020304" pitchFamily="18" charset="0"/>
+                <a:cs typeface="Times New Roman" panose="02020603050405020304" pitchFamily="18" charset="0"/>
+              </a:rPr>
+              <a:t>IV</a:t>
+            </a:r>
+            <a:r>
+              <a:rPr lang="ru-RU" sz="1600" dirty="0">
+                <a:solidFill>
+                  <a:schemeClr val="dk1"/>
+                </a:solidFill>
+                <a:latin typeface="Times New Roman" panose="02020603050405020304" pitchFamily="18" charset="0"/>
+                <a:cs typeface="Times New Roman" panose="02020603050405020304" pitchFamily="18" charset="0"/>
+              </a:rPr>
+              <a:t> курса </a:t>
+            </a:r>
+            <a:br>
+              <a:rPr lang="ru-RU" sz="1600" dirty="0">
+                <a:solidFill>
+                  <a:schemeClr val="dk1"/>
+                </a:solidFill>
+                <a:latin typeface="Times New Roman" panose="02020603050405020304" pitchFamily="18" charset="0"/>
+                <a:cs typeface="Times New Roman" panose="02020603050405020304" pitchFamily="18" charset="0"/>
+              </a:rPr>
+            </a:br>
+            <a:r>
+              <a:rPr lang="ru-RU" sz="1600" dirty="0">
+                <a:solidFill>
+                  <a:schemeClr val="dk1"/>
+                </a:solidFill>
+                <a:latin typeface="Times New Roman" panose="02020603050405020304" pitchFamily="18" charset="0"/>
+                <a:cs typeface="Times New Roman" panose="02020603050405020304" pitchFamily="18" charset="0"/>
+              </a:rPr>
+              <a:t>группы БА-ФИИТ-18 ИМИ СВФУ </a:t>
+            </a:r>
+            <a:endParaRPr dirty="0">
+              <a:latin typeface="Times New Roman" panose="02020603050405020304" pitchFamily="18" charset="0"/>
+              <a:cs typeface="Times New Roman" panose="02020603050405020304" pitchFamily="18" charset="0"/>
+            </a:endParaRPr>
+          </a:p>
+          <a:p>
+            <a:pPr>
+              <a:buClr>
+                <a:schemeClr val="dk1"/>
+              </a:buClr>
+              <a:buSzPts val="1600"/>
+            </a:pPr>
+            <a:r>
+              <a:rPr lang="ru-RU" sz="1600" dirty="0">
+                <a:solidFill>
+                  <a:schemeClr val="dk1"/>
+                </a:solidFill>
+                <a:latin typeface="Times New Roman" panose="02020603050405020304" pitchFamily="18" charset="0"/>
+                <a:cs typeface="Times New Roman" panose="02020603050405020304" pitchFamily="18" charset="0"/>
+              </a:rPr>
+              <a:t>Степанова Надежда Николаевна</a:t>
+            </a:r>
+            <a:endParaRPr sz="1600" dirty="0">
+              <a:solidFill>
+                <a:schemeClr val="dk1"/>
+              </a:solidFill>
+              <a:latin typeface="Times New Roman" panose="02020603050405020304" pitchFamily="18" charset="0"/>
+              <a:cs typeface="Times New Roman" panose="02020603050405020304" pitchFamily="18" charset="0"/>
+            </a:endParaRPr>
+          </a:p>
+          <a:p>
+            <a:pPr>
+              <a:buClr>
+                <a:schemeClr val="dk1"/>
+              </a:buClr>
+              <a:buSzPts val="1600"/>
+            </a:pPr>
+            <a:r>
+              <a:rPr lang="ru-RU" sz="1600" dirty="0">
+                <a:solidFill>
+                  <a:schemeClr val="dk1"/>
+                </a:solidFill>
+                <a:latin typeface="Times New Roman" panose="02020603050405020304" pitchFamily="18" charset="0"/>
+                <a:cs typeface="Times New Roman" panose="02020603050405020304" pitchFamily="18" charset="0"/>
+              </a:rPr>
+              <a:t>Руководитель: </a:t>
+            </a:r>
+            <a:r>
+              <a:rPr lang="ru-RU" sz="1600" dirty="0" err="1">
+                <a:latin typeface="Times New Roman" panose="02020603050405020304" pitchFamily="18" charset="0"/>
+                <a:cs typeface="Times New Roman" panose="02020603050405020304" pitchFamily="18" charset="0"/>
+              </a:rPr>
+              <a:t>Эверстов</a:t>
+            </a:r>
+            <a:r>
+              <a:rPr lang="ru-RU" sz="1600" dirty="0">
+                <a:latin typeface="Times New Roman" panose="02020603050405020304" pitchFamily="18" charset="0"/>
+                <a:cs typeface="Times New Roman" panose="02020603050405020304" pitchFamily="18" charset="0"/>
+              </a:rPr>
+              <a:t> В.В, старший преподаватель кафедры ИТ ИМИ СВФУ</a:t>
+            </a:r>
+            <a:endParaRPr sz="1600" dirty="0">
+              <a:latin typeface="Times New Roman" panose="02020603050405020304" pitchFamily="18" charset="0"/>
+              <a:cs typeface="Times New Roman" panose="02020603050405020304" pitchFamily="18" charset="0"/>
+            </a:endParaRPr>
+          </a:p>
+        </p:txBody>
+      </p:sp>
+      <p:sp>
+        <p:nvSpPr>
+          <p:cNvPr id="8" name="Google Shape;163;g890fc14cac_0_83"/>
+          <p:cNvSpPr txBox="1"/>
+          <p:nvPr/>
+        </p:nvSpPr>
+        <p:spPr>
+          <a:xfrm>
+            <a:off x="5111260" y="6188178"/>
+            <a:ext cx="1969500" cy="449100"/>
+          </a:xfrm>
+          <a:prstGeom prst="rect">
+            <a:avLst/>
+          </a:prstGeom>
+          <a:noFill/>
+          <a:ln>
+            <a:noFill/>
+          </a:ln>
+        </p:spPr>
+        <p:txBody>
+          <a:bodyPr spcFirstLastPara="1" wrap="square" lIns="91425" tIns="45700" rIns="91425" bIns="45700" anchor="t" anchorCtr="0">
+            <a:noAutofit/>
+          </a:bodyPr>
+          <a:lstStyle/>
+          <a:p>
+            <a:pPr algn="ctr">
+              <a:buClr>
+                <a:schemeClr val="dk1"/>
+              </a:buClr>
+              <a:buSzPts val="1600"/>
+            </a:pPr>
+            <a:r>
+              <a:rPr lang="ru-RU" sz="1600" dirty="0">
+                <a:solidFill>
+                  <a:schemeClr val="dk1"/>
+                </a:solidFill>
+                <a:latin typeface="Times New Roman" panose="02020603050405020304" pitchFamily="18" charset="0"/>
+                <a:cs typeface="Times New Roman" panose="02020603050405020304" pitchFamily="18" charset="0"/>
+              </a:rPr>
+              <a:t>Якутск 2022</a:t>
+            </a:r>
+            <a:endParaRPr sz="1600" dirty="0">
+              <a:solidFill>
+                <a:schemeClr val="dk1"/>
+              </a:solidFill>
+              <a:latin typeface="Times New Roman" panose="02020603050405020304" pitchFamily="18" charset="0"/>
+              <a:cs typeface="Times New Roman" panose="02020603050405020304" pitchFamily="18" charset="0"/>
+            </a:endParaRPr>
+          </a:p>
+        </p:txBody>
+      </p:sp>
+    </p:spTree>
+    <p:extLst>
+      <p:ext uri="{BB962C8B-B14F-4D97-AF65-F5344CB8AC3E}">
+        <p14:creationId xmlns:p14="http://schemas.microsoft.com/office/powerpoint/2010/main" val="364391351"/>
+      </p:ext>
+    </p:extLst>
   </p:cSld>
   <p:clrMapOvr>
     <a:masterClrMapping/>

</xml_diff>